<commit_message>
Adding dissertation draft that I will send to Nick Moran
</commit_message>
<xml_diff>
--- a/miscellanous/shapes.pptx
+++ b/miscellanous/shapes.pptx
@@ -5,7 +5,7 @@
     <p:sldMasterId id="2147483648" r:id="rId1"/>
   </p:sldMasterIdLst>
   <p:notesMasterIdLst>
-    <p:notesMasterId r:id="rId14"/>
+    <p:notesMasterId r:id="rId15"/>
   </p:notesMasterIdLst>
   <p:sldIdLst>
     <p:sldId id="256" r:id="rId2"/>
@@ -20,6 +20,7 @@
     <p:sldId id="265" r:id="rId11"/>
     <p:sldId id="266" r:id="rId12"/>
     <p:sldId id="267" r:id="rId13"/>
+    <p:sldId id="268" r:id="rId14"/>
   </p:sldIdLst>
   <p:sldSz cx="12192000" cy="6858000"/>
   <p:notesSz cx="6858000" cy="9144000"/>
@@ -13898,6 +13899,1089 @@
     <p:extLst>
       <p:ext uri="{BB962C8B-B14F-4D97-AF65-F5344CB8AC3E}">
         <p14:creationId xmlns:p14="http://schemas.microsoft.com/office/powerpoint/2010/main" val="3005778720"/>
+      </p:ext>
+    </p:extLst>
+  </p:cSld>
+  <p:clrMapOvr>
+    <a:masterClrMapping/>
+  </p:clrMapOvr>
+</p:sld>
+</file>
+
+<file path=ppt/slides/slide13.xml><?xml version="1.0" encoding="utf-8"?>
+<p:sld xmlns:a="http://schemas.openxmlformats.org/drawingml/2006/main" xmlns:r="http://schemas.openxmlformats.org/officeDocument/2006/relationships" xmlns:p="http://schemas.openxmlformats.org/presentationml/2006/main">
+  <p:cSld>
+    <p:spTree>
+      <p:nvGrpSpPr>
+        <p:cNvPr id="1" name=""/>
+        <p:cNvGrpSpPr/>
+        <p:nvPr/>
+      </p:nvGrpSpPr>
+      <p:grpSpPr>
+        <a:xfrm>
+          <a:off x="0" y="0"/>
+          <a:ext cx="0" cy="0"/>
+          <a:chOff x="0" y="0"/>
+          <a:chExt cx="0" cy="0"/>
+        </a:xfrm>
+      </p:grpSpPr>
+      <p:sp>
+        <p:nvSpPr>
+          <p:cNvPr id="11" name="Oval 10">
+            <a:extLst>
+              <a:ext uri="{FF2B5EF4-FFF2-40B4-BE49-F238E27FC236}">
+                <a16:creationId xmlns:a16="http://schemas.microsoft.com/office/drawing/2014/main" id="{B30A05C0-383E-4F3E-8B92-28A2A36B5C6F}"/>
+              </a:ext>
+            </a:extLst>
+          </p:cNvPr>
+          <p:cNvSpPr/>
+          <p:nvPr/>
+        </p:nvSpPr>
+        <p:spPr>
+          <a:xfrm>
+            <a:off x="4223020" y="1551962"/>
+            <a:ext cx="3108960" cy="3108960"/>
+          </a:xfrm>
+          <a:prstGeom prst="ellipse">
+            <a:avLst/>
+          </a:prstGeom>
+          <a:solidFill>
+            <a:schemeClr val="accent4">
+              <a:lumMod val="60000"/>
+              <a:lumOff val="40000"/>
+              <a:alpha val="5098"/>
+            </a:schemeClr>
+          </a:solidFill>
+        </p:spPr>
+        <p:style>
+          <a:lnRef idx="2">
+            <a:schemeClr val="accent1">
+              <a:shade val="50000"/>
+            </a:schemeClr>
+          </a:lnRef>
+          <a:fillRef idx="1">
+            <a:schemeClr val="accent1"/>
+          </a:fillRef>
+          <a:effectRef idx="0">
+            <a:schemeClr val="accent1"/>
+          </a:effectRef>
+          <a:fontRef idx="minor">
+            <a:schemeClr val="lt1"/>
+          </a:fontRef>
+        </p:style>
+        <p:txBody>
+          <a:bodyPr rtlCol="0" anchor="ctr"/>
+          <a:lstStyle/>
+          <a:p>
+            <a:pPr algn="ctr"/>
+            <a:endParaRPr lang="en-US" dirty="0"/>
+          </a:p>
+        </p:txBody>
+      </p:sp>
+      <p:sp>
+        <p:nvSpPr>
+          <p:cNvPr id="2" name="Oval 1">
+            <a:extLst>
+              <a:ext uri="{FF2B5EF4-FFF2-40B4-BE49-F238E27FC236}">
+                <a16:creationId xmlns:a16="http://schemas.microsoft.com/office/drawing/2014/main" id="{1938BF84-235B-44EB-82A4-4AAAE1A83572}"/>
+              </a:ext>
+            </a:extLst>
+          </p:cNvPr>
+          <p:cNvSpPr/>
+          <p:nvPr/>
+        </p:nvSpPr>
+        <p:spPr>
+          <a:xfrm>
+            <a:off x="5227182" y="274880"/>
+            <a:ext cx="1097280" cy="1097280"/>
+          </a:xfrm>
+          <a:prstGeom prst="ellipse">
+            <a:avLst/>
+          </a:prstGeom>
+        </p:spPr>
+        <p:style>
+          <a:lnRef idx="2">
+            <a:schemeClr val="accent1">
+              <a:shade val="50000"/>
+            </a:schemeClr>
+          </a:lnRef>
+          <a:fillRef idx="1">
+            <a:schemeClr val="accent1"/>
+          </a:fillRef>
+          <a:effectRef idx="0">
+            <a:schemeClr val="accent1"/>
+          </a:effectRef>
+          <a:fontRef idx="minor">
+            <a:schemeClr val="lt1"/>
+          </a:fontRef>
+        </p:style>
+        <p:txBody>
+          <a:bodyPr wrap="none" rtlCol="0" anchor="ctr"/>
+          <a:lstStyle/>
+          <a:p>
+            <a:pPr algn="ctr"/>
+            <a:r>
+              <a:rPr lang="en-US" dirty="0"/>
+              <a:t>Goal</a:t>
+            </a:r>
+          </a:p>
+        </p:txBody>
+      </p:sp>
+      <p:sp>
+        <p:nvSpPr>
+          <p:cNvPr id="3" name="Oval 2">
+            <a:extLst>
+              <a:ext uri="{FF2B5EF4-FFF2-40B4-BE49-F238E27FC236}">
+                <a16:creationId xmlns:a16="http://schemas.microsoft.com/office/drawing/2014/main" id="{82813E74-5D5D-41B3-AC8E-2D8089EF4EA4}"/>
+              </a:ext>
+            </a:extLst>
+          </p:cNvPr>
+          <p:cNvSpPr/>
+          <p:nvPr/>
+        </p:nvSpPr>
+        <p:spPr>
+          <a:xfrm>
+            <a:off x="5318622" y="1771476"/>
+            <a:ext cx="914400" cy="914400"/>
+          </a:xfrm>
+          <a:prstGeom prst="ellipse">
+            <a:avLst/>
+          </a:prstGeom>
+        </p:spPr>
+        <p:style>
+          <a:lnRef idx="2">
+            <a:schemeClr val="accent1">
+              <a:shade val="50000"/>
+            </a:schemeClr>
+          </a:lnRef>
+          <a:fillRef idx="1">
+            <a:schemeClr val="accent1"/>
+          </a:fillRef>
+          <a:effectRef idx="0">
+            <a:schemeClr val="accent1"/>
+          </a:effectRef>
+          <a:fontRef idx="minor">
+            <a:schemeClr val="lt1"/>
+          </a:fontRef>
+        </p:style>
+        <p:txBody>
+          <a:bodyPr wrap="none" rtlCol="0" anchor="ctr"/>
+          <a:lstStyle/>
+          <a:p>
+            <a:pPr algn="ctr"/>
+            <a:r>
+              <a:rPr lang="en-US" dirty="0"/>
+              <a:t>Mean</a:t>
+            </a:r>
+          </a:p>
+        </p:txBody>
+      </p:sp>
+      <p:sp>
+        <p:nvSpPr>
+          <p:cNvPr id="4" name="Oval 3">
+            <a:extLst>
+              <a:ext uri="{FF2B5EF4-FFF2-40B4-BE49-F238E27FC236}">
+                <a16:creationId xmlns:a16="http://schemas.microsoft.com/office/drawing/2014/main" id="{0F6DC0F6-B294-40EC-9357-97000B5E53A4}"/>
+              </a:ext>
+            </a:extLst>
+          </p:cNvPr>
+          <p:cNvSpPr/>
+          <p:nvPr/>
+        </p:nvSpPr>
+        <p:spPr>
+          <a:xfrm>
+            <a:off x="4437778" y="2652320"/>
+            <a:ext cx="914400" cy="914400"/>
+          </a:xfrm>
+          <a:prstGeom prst="ellipse">
+            <a:avLst/>
+          </a:prstGeom>
+        </p:spPr>
+        <p:style>
+          <a:lnRef idx="2">
+            <a:schemeClr val="accent2">
+              <a:shade val="50000"/>
+            </a:schemeClr>
+          </a:lnRef>
+          <a:fillRef idx="1">
+            <a:schemeClr val="accent2"/>
+          </a:fillRef>
+          <a:effectRef idx="0">
+            <a:schemeClr val="accent2"/>
+          </a:effectRef>
+          <a:fontRef idx="minor">
+            <a:schemeClr val="lt1"/>
+          </a:fontRef>
+        </p:style>
+        <p:txBody>
+          <a:bodyPr wrap="none" lIns="0" tIns="0" rIns="0" bIns="0" rtlCol="0" anchor="ctr"/>
+          <a:lstStyle/>
+          <a:p>
+            <a:pPr algn="ctr"/>
+            <a:r>
+              <a:rPr lang="en-US" dirty="0"/>
+              <a:t>Actions</a:t>
+            </a:r>
+          </a:p>
+        </p:txBody>
+      </p:sp>
+      <p:sp>
+        <p:nvSpPr>
+          <p:cNvPr id="5" name="Oval 4">
+            <a:extLst>
+              <a:ext uri="{FF2B5EF4-FFF2-40B4-BE49-F238E27FC236}">
+                <a16:creationId xmlns:a16="http://schemas.microsoft.com/office/drawing/2014/main" id="{1399CCE1-25F1-4D49-A3D5-BC34CCE9F888}"/>
+              </a:ext>
+            </a:extLst>
+          </p:cNvPr>
+          <p:cNvSpPr/>
+          <p:nvPr/>
+        </p:nvSpPr>
+        <p:spPr>
+          <a:xfrm>
+            <a:off x="5318622" y="3533164"/>
+            <a:ext cx="914400" cy="914400"/>
+          </a:xfrm>
+          <a:prstGeom prst="ellipse">
+            <a:avLst/>
+          </a:prstGeom>
+        </p:spPr>
+        <p:style>
+          <a:lnRef idx="2">
+            <a:schemeClr val="accent3">
+              <a:shade val="50000"/>
+            </a:schemeClr>
+          </a:lnRef>
+          <a:fillRef idx="1">
+            <a:schemeClr val="accent3"/>
+          </a:fillRef>
+          <a:effectRef idx="0">
+            <a:schemeClr val="accent3"/>
+          </a:effectRef>
+          <a:fontRef idx="minor">
+            <a:schemeClr val="lt1"/>
+          </a:fontRef>
+        </p:style>
+        <p:txBody>
+          <a:bodyPr wrap="none" rtlCol="0" anchor="ctr"/>
+          <a:lstStyle/>
+          <a:p>
+            <a:pPr algn="ctr"/>
+            <a:r>
+              <a:rPr lang="en-US" dirty="0"/>
+              <a:t>Feature</a:t>
+            </a:r>
+          </a:p>
+        </p:txBody>
+      </p:sp>
+      <p:sp>
+        <p:nvSpPr>
+          <p:cNvPr id="6" name="Oval 5">
+            <a:extLst>
+              <a:ext uri="{FF2B5EF4-FFF2-40B4-BE49-F238E27FC236}">
+                <a16:creationId xmlns:a16="http://schemas.microsoft.com/office/drawing/2014/main" id="{7F02B953-9241-4083-950A-E1CEDCB04E73}"/>
+              </a:ext>
+            </a:extLst>
+          </p:cNvPr>
+          <p:cNvSpPr/>
+          <p:nvPr/>
+        </p:nvSpPr>
+        <p:spPr>
+          <a:xfrm>
+            <a:off x="6199466" y="2652320"/>
+            <a:ext cx="914400" cy="914400"/>
+          </a:xfrm>
+          <a:prstGeom prst="ellipse">
+            <a:avLst/>
+          </a:prstGeom>
+        </p:spPr>
+        <p:style>
+          <a:lnRef idx="2">
+            <a:schemeClr val="accent6">
+              <a:shade val="50000"/>
+            </a:schemeClr>
+          </a:lnRef>
+          <a:fillRef idx="1">
+            <a:schemeClr val="accent6"/>
+          </a:fillRef>
+          <a:effectRef idx="0">
+            <a:schemeClr val="accent6"/>
+          </a:effectRef>
+          <a:fontRef idx="minor">
+            <a:schemeClr val="lt1"/>
+          </a:fontRef>
+        </p:style>
+        <p:txBody>
+          <a:bodyPr rtlCol="0" anchor="ctr"/>
+          <a:lstStyle/>
+          <a:p>
+            <a:pPr algn="ctr"/>
+            <a:r>
+              <a:rPr lang="en-US" dirty="0"/>
+              <a:t>Path</a:t>
+            </a:r>
+          </a:p>
+        </p:txBody>
+      </p:sp>
+      <p:sp>
+        <p:nvSpPr>
+          <p:cNvPr id="7" name="Oval 6">
+            <a:extLst>
+              <a:ext uri="{FF2B5EF4-FFF2-40B4-BE49-F238E27FC236}">
+                <a16:creationId xmlns:a16="http://schemas.microsoft.com/office/drawing/2014/main" id="{657C1577-F27D-4B27-8BA5-058C4817B7A6}"/>
+              </a:ext>
+            </a:extLst>
+          </p:cNvPr>
+          <p:cNvSpPr/>
+          <p:nvPr/>
+        </p:nvSpPr>
+        <p:spPr>
+          <a:xfrm>
+            <a:off x="2941182" y="2560880"/>
+            <a:ext cx="1097280" cy="1097280"/>
+          </a:xfrm>
+          <a:prstGeom prst="ellipse">
+            <a:avLst/>
+          </a:prstGeom>
+        </p:spPr>
+        <p:style>
+          <a:lnRef idx="2">
+            <a:schemeClr val="accent2">
+              <a:shade val="50000"/>
+            </a:schemeClr>
+          </a:lnRef>
+          <a:fillRef idx="1">
+            <a:schemeClr val="accent2"/>
+          </a:fillRef>
+          <a:effectRef idx="0">
+            <a:schemeClr val="accent2"/>
+          </a:effectRef>
+          <a:fontRef idx="minor">
+            <a:schemeClr val="lt1"/>
+          </a:fontRef>
+        </p:style>
+        <p:txBody>
+          <a:bodyPr rtlCol="0" anchor="ctr"/>
+          <a:lstStyle/>
+          <a:p>
+            <a:pPr algn="ctr"/>
+            <a:r>
+              <a:rPr lang="en-US" dirty="0"/>
+              <a:t>Other Skills</a:t>
+            </a:r>
+          </a:p>
+        </p:txBody>
+      </p:sp>
+      <p:sp>
+        <p:nvSpPr>
+          <p:cNvPr id="9" name="Oval 8">
+            <a:extLst>
+              <a:ext uri="{FF2B5EF4-FFF2-40B4-BE49-F238E27FC236}">
+                <a16:creationId xmlns:a16="http://schemas.microsoft.com/office/drawing/2014/main" id="{77BD9123-4339-49C8-BB06-276216FFA5A3}"/>
+              </a:ext>
+            </a:extLst>
+          </p:cNvPr>
+          <p:cNvSpPr/>
+          <p:nvPr/>
+        </p:nvSpPr>
+        <p:spPr>
+          <a:xfrm>
+            <a:off x="7513182" y="2532079"/>
+            <a:ext cx="1097280" cy="1097280"/>
+          </a:xfrm>
+          <a:prstGeom prst="ellipse">
+            <a:avLst/>
+          </a:prstGeom>
+        </p:spPr>
+        <p:style>
+          <a:lnRef idx="2">
+            <a:schemeClr val="accent6">
+              <a:shade val="50000"/>
+            </a:schemeClr>
+          </a:lnRef>
+          <a:fillRef idx="1">
+            <a:schemeClr val="accent6"/>
+          </a:fillRef>
+          <a:effectRef idx="0">
+            <a:schemeClr val="accent6"/>
+          </a:effectRef>
+          <a:fontRef idx="minor">
+            <a:schemeClr val="lt1"/>
+          </a:fontRef>
+        </p:style>
+        <p:txBody>
+          <a:bodyPr wrap="none" rtlCol="0" anchor="ctr"/>
+          <a:lstStyle/>
+          <a:p>
+            <a:pPr algn="ctr"/>
+            <a:r>
+              <a:rPr lang="en-US" dirty="0"/>
+              <a:t>Manner</a:t>
+            </a:r>
+          </a:p>
+        </p:txBody>
+      </p:sp>
+      <p:sp>
+        <p:nvSpPr>
+          <p:cNvPr id="10" name="Oval 9">
+            <a:extLst>
+              <a:ext uri="{FF2B5EF4-FFF2-40B4-BE49-F238E27FC236}">
+                <a16:creationId xmlns:a16="http://schemas.microsoft.com/office/drawing/2014/main" id="{DD89ED82-4F60-45CD-B3E5-7F509BB0B12C}"/>
+              </a:ext>
+            </a:extLst>
+          </p:cNvPr>
+          <p:cNvSpPr/>
+          <p:nvPr/>
+        </p:nvSpPr>
+        <p:spPr>
+          <a:xfrm>
+            <a:off x="5227182" y="4846880"/>
+            <a:ext cx="1097280" cy="1097280"/>
+          </a:xfrm>
+          <a:prstGeom prst="ellipse">
+            <a:avLst/>
+          </a:prstGeom>
+        </p:spPr>
+        <p:style>
+          <a:lnRef idx="2">
+            <a:schemeClr val="accent3">
+              <a:shade val="50000"/>
+            </a:schemeClr>
+          </a:lnRef>
+          <a:fillRef idx="1">
+            <a:schemeClr val="accent3"/>
+          </a:fillRef>
+          <a:effectRef idx="0">
+            <a:schemeClr val="accent3"/>
+          </a:effectRef>
+          <a:fontRef idx="minor">
+            <a:schemeClr val="lt1"/>
+          </a:fontRef>
+        </p:style>
+        <p:txBody>
+          <a:bodyPr wrap="none" rtlCol="0" anchor="ctr"/>
+          <a:lstStyle/>
+          <a:p>
+            <a:pPr algn="ctr"/>
+            <a:r>
+              <a:rPr lang="en-US" dirty="0"/>
+              <a:t>Symbolic</a:t>
+            </a:r>
+          </a:p>
+        </p:txBody>
+      </p:sp>
+      <p:sp>
+        <p:nvSpPr>
+          <p:cNvPr id="12" name="Oval 11">
+            <a:extLst>
+              <a:ext uri="{FF2B5EF4-FFF2-40B4-BE49-F238E27FC236}">
+                <a16:creationId xmlns:a16="http://schemas.microsoft.com/office/drawing/2014/main" id="{6D5D74FA-E319-41C3-BEF6-83D16CB48FAF}"/>
+              </a:ext>
+            </a:extLst>
+          </p:cNvPr>
+          <p:cNvSpPr/>
+          <p:nvPr/>
+        </p:nvSpPr>
+        <p:spPr>
+          <a:xfrm>
+            <a:off x="5736113" y="4418619"/>
+            <a:ext cx="91440" cy="91440"/>
+          </a:xfrm>
+          <a:prstGeom prst="ellipse">
+            <a:avLst/>
+          </a:prstGeom>
+          <a:solidFill>
+            <a:schemeClr val="bg2">
+              <a:lumMod val="90000"/>
+            </a:schemeClr>
+          </a:solidFill>
+        </p:spPr>
+        <p:style>
+          <a:lnRef idx="2">
+            <a:schemeClr val="accent1">
+              <a:shade val="50000"/>
+            </a:schemeClr>
+          </a:lnRef>
+          <a:fillRef idx="1">
+            <a:schemeClr val="accent1"/>
+          </a:fillRef>
+          <a:effectRef idx="0">
+            <a:schemeClr val="accent1"/>
+          </a:effectRef>
+          <a:fontRef idx="minor">
+            <a:schemeClr val="lt1"/>
+          </a:fontRef>
+        </p:style>
+        <p:txBody>
+          <a:bodyPr rtlCol="0" anchor="ctr"/>
+          <a:lstStyle/>
+          <a:p>
+            <a:pPr algn="ctr"/>
+            <a:endParaRPr lang="en-US"/>
+          </a:p>
+        </p:txBody>
+      </p:sp>
+      <p:sp>
+        <p:nvSpPr>
+          <p:cNvPr id="13" name="Oval 12">
+            <a:extLst>
+              <a:ext uri="{FF2B5EF4-FFF2-40B4-BE49-F238E27FC236}">
+                <a16:creationId xmlns:a16="http://schemas.microsoft.com/office/drawing/2014/main" id="{775CAD5C-B79A-45AC-BBD9-6850196C1269}"/>
+              </a:ext>
+            </a:extLst>
+          </p:cNvPr>
+          <p:cNvSpPr/>
+          <p:nvPr/>
+        </p:nvSpPr>
+        <p:spPr>
+          <a:xfrm>
+            <a:off x="5736113" y="4775151"/>
+            <a:ext cx="91440" cy="91440"/>
+          </a:xfrm>
+          <a:prstGeom prst="ellipse">
+            <a:avLst/>
+          </a:prstGeom>
+          <a:solidFill>
+            <a:schemeClr val="bg2">
+              <a:lumMod val="90000"/>
+            </a:schemeClr>
+          </a:solidFill>
+        </p:spPr>
+        <p:style>
+          <a:lnRef idx="2">
+            <a:schemeClr val="accent1">
+              <a:shade val="50000"/>
+            </a:schemeClr>
+          </a:lnRef>
+          <a:fillRef idx="1">
+            <a:schemeClr val="accent1"/>
+          </a:fillRef>
+          <a:effectRef idx="0">
+            <a:schemeClr val="accent1"/>
+          </a:effectRef>
+          <a:fontRef idx="minor">
+            <a:schemeClr val="lt1"/>
+          </a:fontRef>
+        </p:style>
+        <p:txBody>
+          <a:bodyPr rtlCol="0" anchor="ctr"/>
+          <a:lstStyle/>
+          <a:p>
+            <a:pPr algn="ctr"/>
+            <a:endParaRPr lang="en-US"/>
+          </a:p>
+        </p:txBody>
+      </p:sp>
+      <p:cxnSp>
+        <p:nvCxnSpPr>
+          <p:cNvPr id="15" name="Straight Connector 14">
+            <a:extLst>
+              <a:ext uri="{FF2B5EF4-FFF2-40B4-BE49-F238E27FC236}">
+                <a16:creationId xmlns:a16="http://schemas.microsoft.com/office/drawing/2014/main" id="{6C7E04F1-2E80-4DCB-8FFF-F82B3740DAEA}"/>
+              </a:ext>
+            </a:extLst>
+          </p:cNvPr>
+          <p:cNvCxnSpPr>
+            <a:stCxn id="12" idx="4"/>
+            <a:endCxn id="13" idx="0"/>
+          </p:cNvCxnSpPr>
+          <p:nvPr/>
+        </p:nvCxnSpPr>
+        <p:spPr>
+          <a:xfrm>
+            <a:off x="5781833" y="4510059"/>
+            <a:ext cx="0" cy="265092"/>
+          </a:xfrm>
+          <a:prstGeom prst="line">
+            <a:avLst/>
+          </a:prstGeom>
+        </p:spPr>
+        <p:style>
+          <a:lnRef idx="1">
+            <a:schemeClr val="accent1"/>
+          </a:lnRef>
+          <a:fillRef idx="0">
+            <a:schemeClr val="accent1"/>
+          </a:fillRef>
+          <a:effectRef idx="0">
+            <a:schemeClr val="accent1"/>
+          </a:effectRef>
+          <a:fontRef idx="minor">
+            <a:schemeClr val="tx1"/>
+          </a:fontRef>
+        </p:style>
+      </p:cxnSp>
+      <p:sp>
+        <p:nvSpPr>
+          <p:cNvPr id="16" name="Oval 15">
+            <a:extLst>
+              <a:ext uri="{FF2B5EF4-FFF2-40B4-BE49-F238E27FC236}">
+                <a16:creationId xmlns:a16="http://schemas.microsoft.com/office/drawing/2014/main" id="{229B6344-B2A0-40E0-9625-7DA25DF432A3}"/>
+              </a:ext>
+            </a:extLst>
+          </p:cNvPr>
+          <p:cNvSpPr/>
+          <p:nvPr/>
+        </p:nvSpPr>
+        <p:spPr>
+          <a:xfrm>
+            <a:off x="5736113" y="1346293"/>
+            <a:ext cx="91440" cy="91440"/>
+          </a:xfrm>
+          <a:prstGeom prst="ellipse">
+            <a:avLst/>
+          </a:prstGeom>
+          <a:solidFill>
+            <a:schemeClr val="bg2">
+              <a:lumMod val="90000"/>
+            </a:schemeClr>
+          </a:solidFill>
+        </p:spPr>
+        <p:style>
+          <a:lnRef idx="2">
+            <a:schemeClr val="accent1">
+              <a:shade val="50000"/>
+            </a:schemeClr>
+          </a:lnRef>
+          <a:fillRef idx="1">
+            <a:schemeClr val="accent1"/>
+          </a:fillRef>
+          <a:effectRef idx="0">
+            <a:schemeClr val="accent1"/>
+          </a:effectRef>
+          <a:fontRef idx="minor">
+            <a:schemeClr val="lt1"/>
+          </a:fontRef>
+        </p:style>
+        <p:txBody>
+          <a:bodyPr rtlCol="0" anchor="ctr"/>
+          <a:lstStyle/>
+          <a:p>
+            <a:pPr algn="ctr"/>
+            <a:endParaRPr lang="en-US"/>
+          </a:p>
+        </p:txBody>
+      </p:sp>
+      <p:sp>
+        <p:nvSpPr>
+          <p:cNvPr id="17" name="Oval 16">
+            <a:extLst>
+              <a:ext uri="{FF2B5EF4-FFF2-40B4-BE49-F238E27FC236}">
+                <a16:creationId xmlns:a16="http://schemas.microsoft.com/office/drawing/2014/main" id="{00B4BC29-62C2-4F1F-B65D-B69EA37A2279}"/>
+              </a:ext>
+            </a:extLst>
+          </p:cNvPr>
+          <p:cNvSpPr/>
+          <p:nvPr/>
+        </p:nvSpPr>
+        <p:spPr>
+          <a:xfrm>
+            <a:off x="5736113" y="1702825"/>
+            <a:ext cx="91440" cy="91440"/>
+          </a:xfrm>
+          <a:prstGeom prst="ellipse">
+            <a:avLst/>
+          </a:prstGeom>
+          <a:solidFill>
+            <a:schemeClr val="bg2">
+              <a:lumMod val="90000"/>
+            </a:schemeClr>
+          </a:solidFill>
+        </p:spPr>
+        <p:style>
+          <a:lnRef idx="2">
+            <a:schemeClr val="accent1">
+              <a:shade val="50000"/>
+            </a:schemeClr>
+          </a:lnRef>
+          <a:fillRef idx="1">
+            <a:schemeClr val="accent1"/>
+          </a:fillRef>
+          <a:effectRef idx="0">
+            <a:schemeClr val="accent1"/>
+          </a:effectRef>
+          <a:fontRef idx="minor">
+            <a:schemeClr val="lt1"/>
+          </a:fontRef>
+        </p:style>
+        <p:txBody>
+          <a:bodyPr rtlCol="0" anchor="ctr"/>
+          <a:lstStyle/>
+          <a:p>
+            <a:pPr algn="ctr"/>
+            <a:endParaRPr lang="en-US"/>
+          </a:p>
+        </p:txBody>
+      </p:sp>
+      <p:cxnSp>
+        <p:nvCxnSpPr>
+          <p:cNvPr id="18" name="Straight Connector 17">
+            <a:extLst>
+              <a:ext uri="{FF2B5EF4-FFF2-40B4-BE49-F238E27FC236}">
+                <a16:creationId xmlns:a16="http://schemas.microsoft.com/office/drawing/2014/main" id="{70DE1CC5-AAD7-447E-AF51-57871CF574C6}"/>
+              </a:ext>
+            </a:extLst>
+          </p:cNvPr>
+          <p:cNvCxnSpPr>
+            <a:stCxn id="16" idx="4"/>
+            <a:endCxn id="17" idx="0"/>
+          </p:cNvCxnSpPr>
+          <p:nvPr/>
+        </p:nvCxnSpPr>
+        <p:spPr>
+          <a:xfrm>
+            <a:off x="5781833" y="1437733"/>
+            <a:ext cx="0" cy="265092"/>
+          </a:xfrm>
+          <a:prstGeom prst="line">
+            <a:avLst/>
+          </a:prstGeom>
+        </p:spPr>
+        <p:style>
+          <a:lnRef idx="1">
+            <a:schemeClr val="accent1"/>
+          </a:lnRef>
+          <a:fillRef idx="0">
+            <a:schemeClr val="accent1"/>
+          </a:fillRef>
+          <a:effectRef idx="0">
+            <a:schemeClr val="accent1"/>
+          </a:effectRef>
+          <a:fontRef idx="minor">
+            <a:schemeClr val="tx1"/>
+          </a:fontRef>
+        </p:style>
+      </p:cxnSp>
+      <p:grpSp>
+        <p:nvGrpSpPr>
+          <p:cNvPr id="26" name="Group 25">
+            <a:extLst>
+              <a:ext uri="{FF2B5EF4-FFF2-40B4-BE49-F238E27FC236}">
+                <a16:creationId xmlns:a16="http://schemas.microsoft.com/office/drawing/2014/main" id="{DBCB1ED6-4EA5-4DC4-BE04-30A32471DE6B}"/>
+              </a:ext>
+            </a:extLst>
+          </p:cNvPr>
+          <p:cNvGrpSpPr/>
+          <p:nvPr/>
+        </p:nvGrpSpPr>
+        <p:grpSpPr>
+          <a:xfrm rot="5400000">
+            <a:off x="7292132" y="2882456"/>
+            <a:ext cx="91440" cy="447972"/>
+            <a:chOff x="2941181" y="1090568"/>
+            <a:chExt cx="91440" cy="447972"/>
+          </a:xfrm>
+        </p:grpSpPr>
+        <p:sp>
+          <p:nvSpPr>
+            <p:cNvPr id="19" name="Oval 18">
+              <a:extLst>
+                <a:ext uri="{FF2B5EF4-FFF2-40B4-BE49-F238E27FC236}">
+                  <a16:creationId xmlns:a16="http://schemas.microsoft.com/office/drawing/2014/main" id="{92083C3B-1F1B-40CD-998B-71CEAC41DFCF}"/>
+                </a:ext>
+              </a:extLst>
+            </p:cNvPr>
+            <p:cNvSpPr/>
+            <p:nvPr/>
+          </p:nvSpPr>
+          <p:spPr>
+            <a:xfrm>
+              <a:off x="2941181" y="1090568"/>
+              <a:ext cx="91440" cy="91440"/>
+            </a:xfrm>
+            <a:prstGeom prst="ellipse">
+              <a:avLst/>
+            </a:prstGeom>
+            <a:solidFill>
+              <a:schemeClr val="bg2">
+                <a:lumMod val="90000"/>
+              </a:schemeClr>
+            </a:solidFill>
+          </p:spPr>
+          <p:style>
+            <a:lnRef idx="2">
+              <a:schemeClr val="accent1">
+                <a:shade val="50000"/>
+              </a:schemeClr>
+            </a:lnRef>
+            <a:fillRef idx="1">
+              <a:schemeClr val="accent1"/>
+            </a:fillRef>
+            <a:effectRef idx="0">
+              <a:schemeClr val="accent1"/>
+            </a:effectRef>
+            <a:fontRef idx="minor">
+              <a:schemeClr val="lt1"/>
+            </a:fontRef>
+          </p:style>
+          <p:txBody>
+            <a:bodyPr rtlCol="0" anchor="ctr"/>
+            <a:lstStyle/>
+            <a:p>
+              <a:pPr algn="ctr"/>
+              <a:endParaRPr lang="en-US"/>
+            </a:p>
+          </p:txBody>
+        </p:sp>
+        <p:sp>
+          <p:nvSpPr>
+            <p:cNvPr id="20" name="Oval 19">
+              <a:extLst>
+                <a:ext uri="{FF2B5EF4-FFF2-40B4-BE49-F238E27FC236}">
+                  <a16:creationId xmlns:a16="http://schemas.microsoft.com/office/drawing/2014/main" id="{784DFE51-A6EA-4724-8FAB-1435940973C0}"/>
+                </a:ext>
+              </a:extLst>
+            </p:cNvPr>
+            <p:cNvSpPr/>
+            <p:nvPr/>
+          </p:nvSpPr>
+          <p:spPr>
+            <a:xfrm>
+              <a:off x="2941181" y="1447100"/>
+              <a:ext cx="91440" cy="91440"/>
+            </a:xfrm>
+            <a:prstGeom prst="ellipse">
+              <a:avLst/>
+            </a:prstGeom>
+            <a:solidFill>
+              <a:schemeClr val="bg2">
+                <a:lumMod val="90000"/>
+              </a:schemeClr>
+            </a:solidFill>
+          </p:spPr>
+          <p:style>
+            <a:lnRef idx="2">
+              <a:schemeClr val="accent1">
+                <a:shade val="50000"/>
+              </a:schemeClr>
+            </a:lnRef>
+            <a:fillRef idx="1">
+              <a:schemeClr val="accent1"/>
+            </a:fillRef>
+            <a:effectRef idx="0">
+              <a:schemeClr val="accent1"/>
+            </a:effectRef>
+            <a:fontRef idx="minor">
+              <a:schemeClr val="lt1"/>
+            </a:fontRef>
+          </p:style>
+          <p:txBody>
+            <a:bodyPr rtlCol="0" anchor="ctr"/>
+            <a:lstStyle/>
+            <a:p>
+              <a:pPr algn="ctr"/>
+              <a:endParaRPr lang="en-US"/>
+            </a:p>
+          </p:txBody>
+        </p:sp>
+        <p:cxnSp>
+          <p:nvCxnSpPr>
+            <p:cNvPr id="21" name="Straight Connector 20">
+              <a:extLst>
+                <a:ext uri="{FF2B5EF4-FFF2-40B4-BE49-F238E27FC236}">
+                  <a16:creationId xmlns:a16="http://schemas.microsoft.com/office/drawing/2014/main" id="{38AED743-14CC-4B5C-8AC8-3A3AEACB193B}"/>
+                </a:ext>
+              </a:extLst>
+            </p:cNvPr>
+            <p:cNvCxnSpPr>
+              <a:cxnSpLocks/>
+              <a:stCxn id="19" idx="4"/>
+              <a:endCxn id="20" idx="0"/>
+            </p:cNvCxnSpPr>
+            <p:nvPr/>
+          </p:nvCxnSpPr>
+          <p:spPr>
+            <a:xfrm>
+              <a:off x="2986901" y="1182008"/>
+              <a:ext cx="0" cy="265092"/>
+            </a:xfrm>
+            <a:prstGeom prst="line">
+              <a:avLst/>
+            </a:prstGeom>
+          </p:spPr>
+          <p:style>
+            <a:lnRef idx="1">
+              <a:schemeClr val="accent1"/>
+            </a:lnRef>
+            <a:fillRef idx="0">
+              <a:schemeClr val="accent1"/>
+            </a:fillRef>
+            <a:effectRef idx="0">
+              <a:schemeClr val="accent1"/>
+            </a:effectRef>
+            <a:fontRef idx="minor">
+              <a:schemeClr val="tx1"/>
+            </a:fontRef>
+          </p:style>
+        </p:cxnSp>
+      </p:grpSp>
+      <p:grpSp>
+        <p:nvGrpSpPr>
+          <p:cNvPr id="27" name="Group 26">
+            <a:extLst>
+              <a:ext uri="{FF2B5EF4-FFF2-40B4-BE49-F238E27FC236}">
+                <a16:creationId xmlns:a16="http://schemas.microsoft.com/office/drawing/2014/main" id="{3F7FD7D9-C58C-41E4-A1EE-1FCB232094B6}"/>
+              </a:ext>
+            </a:extLst>
+          </p:cNvPr>
+          <p:cNvGrpSpPr/>
+          <p:nvPr/>
+        </p:nvGrpSpPr>
+        <p:grpSpPr>
+          <a:xfrm rot="5400000">
+            <a:off x="4192400" y="2882456"/>
+            <a:ext cx="91440" cy="447972"/>
+            <a:chOff x="2941181" y="1090568"/>
+            <a:chExt cx="91440" cy="447972"/>
+          </a:xfrm>
+        </p:grpSpPr>
+        <p:sp>
+          <p:nvSpPr>
+            <p:cNvPr id="28" name="Oval 27">
+              <a:extLst>
+                <a:ext uri="{FF2B5EF4-FFF2-40B4-BE49-F238E27FC236}">
+                  <a16:creationId xmlns:a16="http://schemas.microsoft.com/office/drawing/2014/main" id="{7FD68A78-6624-4222-B3FC-BCF20A329101}"/>
+                </a:ext>
+              </a:extLst>
+            </p:cNvPr>
+            <p:cNvSpPr/>
+            <p:nvPr/>
+          </p:nvSpPr>
+          <p:spPr>
+            <a:xfrm>
+              <a:off x="2941181" y="1090568"/>
+              <a:ext cx="91440" cy="91440"/>
+            </a:xfrm>
+            <a:prstGeom prst="ellipse">
+              <a:avLst/>
+            </a:prstGeom>
+            <a:solidFill>
+              <a:schemeClr val="bg2">
+                <a:lumMod val="90000"/>
+              </a:schemeClr>
+            </a:solidFill>
+          </p:spPr>
+          <p:style>
+            <a:lnRef idx="2">
+              <a:schemeClr val="accent1">
+                <a:shade val="50000"/>
+              </a:schemeClr>
+            </a:lnRef>
+            <a:fillRef idx="1">
+              <a:schemeClr val="accent1"/>
+            </a:fillRef>
+            <a:effectRef idx="0">
+              <a:schemeClr val="accent1"/>
+            </a:effectRef>
+            <a:fontRef idx="minor">
+              <a:schemeClr val="lt1"/>
+            </a:fontRef>
+          </p:style>
+          <p:txBody>
+            <a:bodyPr rtlCol="0" anchor="ctr"/>
+            <a:lstStyle/>
+            <a:p>
+              <a:pPr algn="ctr"/>
+              <a:endParaRPr lang="en-US"/>
+            </a:p>
+          </p:txBody>
+        </p:sp>
+        <p:sp>
+          <p:nvSpPr>
+            <p:cNvPr id="29" name="Oval 28">
+              <a:extLst>
+                <a:ext uri="{FF2B5EF4-FFF2-40B4-BE49-F238E27FC236}">
+                  <a16:creationId xmlns:a16="http://schemas.microsoft.com/office/drawing/2014/main" id="{CC51B31C-4881-4E35-BB9F-AAD3B2BB8A7B}"/>
+                </a:ext>
+              </a:extLst>
+            </p:cNvPr>
+            <p:cNvSpPr/>
+            <p:nvPr/>
+          </p:nvSpPr>
+          <p:spPr>
+            <a:xfrm>
+              <a:off x="2941181" y="1447100"/>
+              <a:ext cx="91440" cy="91440"/>
+            </a:xfrm>
+            <a:prstGeom prst="ellipse">
+              <a:avLst/>
+            </a:prstGeom>
+            <a:solidFill>
+              <a:schemeClr val="bg2">
+                <a:lumMod val="90000"/>
+              </a:schemeClr>
+            </a:solidFill>
+          </p:spPr>
+          <p:style>
+            <a:lnRef idx="2">
+              <a:schemeClr val="accent1">
+                <a:shade val="50000"/>
+              </a:schemeClr>
+            </a:lnRef>
+            <a:fillRef idx="1">
+              <a:schemeClr val="accent1"/>
+            </a:fillRef>
+            <a:effectRef idx="0">
+              <a:schemeClr val="accent1"/>
+            </a:effectRef>
+            <a:fontRef idx="minor">
+              <a:schemeClr val="lt1"/>
+            </a:fontRef>
+          </p:style>
+          <p:txBody>
+            <a:bodyPr rtlCol="0" anchor="ctr"/>
+            <a:lstStyle/>
+            <a:p>
+              <a:pPr algn="ctr"/>
+              <a:endParaRPr lang="en-US"/>
+            </a:p>
+          </p:txBody>
+        </p:sp>
+        <p:cxnSp>
+          <p:nvCxnSpPr>
+            <p:cNvPr id="30" name="Straight Connector 29">
+              <a:extLst>
+                <a:ext uri="{FF2B5EF4-FFF2-40B4-BE49-F238E27FC236}">
+                  <a16:creationId xmlns:a16="http://schemas.microsoft.com/office/drawing/2014/main" id="{0F6025FF-CD92-4C68-8401-0486467B3072}"/>
+                </a:ext>
+              </a:extLst>
+            </p:cNvPr>
+            <p:cNvCxnSpPr>
+              <a:cxnSpLocks/>
+              <a:stCxn id="28" idx="4"/>
+              <a:endCxn id="29" idx="0"/>
+            </p:cNvCxnSpPr>
+            <p:nvPr/>
+          </p:nvCxnSpPr>
+          <p:spPr>
+            <a:xfrm>
+              <a:off x="2986901" y="1182008"/>
+              <a:ext cx="0" cy="265092"/>
+            </a:xfrm>
+            <a:prstGeom prst="line">
+              <a:avLst/>
+            </a:prstGeom>
+          </p:spPr>
+          <p:style>
+            <a:lnRef idx="1">
+              <a:schemeClr val="accent1"/>
+            </a:lnRef>
+            <a:fillRef idx="0">
+              <a:schemeClr val="accent1"/>
+            </a:fillRef>
+            <a:effectRef idx="0">
+              <a:schemeClr val="accent1"/>
+            </a:effectRef>
+            <a:fontRef idx="minor">
+              <a:schemeClr val="tx1"/>
+            </a:fontRef>
+          </p:style>
+        </p:cxnSp>
+      </p:grpSp>
+    </p:spTree>
+    <p:extLst>
+      <p:ext uri="{BB962C8B-B14F-4D97-AF65-F5344CB8AC3E}">
+        <p14:creationId xmlns:p14="http://schemas.microsoft.com/office/powerpoint/2010/main" val="3176175702"/>
       </p:ext>
     </p:extLst>
   </p:cSld>

</xml_diff>